<commit_message>
add R23-26 slides and codes
</commit_message>
<xml_diff>
--- a/R/スライド/第23回.pptx
+++ b/R/スライド/第23回.pptx
@@ -10,9 +10,10 @@
     <p:sldId id="258" r:id="rId4"/>
     <p:sldId id="261" r:id="rId5"/>
     <p:sldId id="260" r:id="rId6"/>
-    <p:sldId id="264" r:id="rId7"/>
-    <p:sldId id="262" r:id="rId8"/>
-    <p:sldId id="263" r:id="rId9"/>
+    <p:sldId id="265" r:id="rId7"/>
+    <p:sldId id="264" r:id="rId8"/>
+    <p:sldId id="262" r:id="rId9"/>
+    <p:sldId id="263" r:id="rId10"/>
   </p:sldIdLst>
   <p:sldSz cx="12192000" cy="6858000"/>
   <p:notesSz cx="6858000" cy="9144000"/>
@@ -266,7 +267,7 @@
           <a:p>
             <a:fld id="{E4245ECD-3E8A-534F-BCF2-3F40B55B6962}" type="datetimeFigureOut">
               <a:rPr kumimoji="1" lang="ja-JP" altLang="en-US" smtClean="0"/>
-              <a:t>2021/8/4</a:t>
+              <a:t>2021/11/12</a:t>
             </a:fld>
             <a:endParaRPr kumimoji="1" lang="ja-JP" altLang="en-US"/>
           </a:p>
@@ -496,7 +497,7 @@
           <a:p>
             <a:fld id="{E4245ECD-3E8A-534F-BCF2-3F40B55B6962}" type="datetimeFigureOut">
               <a:rPr kumimoji="1" lang="ja-JP" altLang="en-US" smtClean="0"/>
-              <a:t>2021/8/4</a:t>
+              <a:t>2021/11/12</a:t>
             </a:fld>
             <a:endParaRPr kumimoji="1" lang="ja-JP" altLang="en-US"/>
           </a:p>
@@ -736,7 +737,7 @@
           <a:p>
             <a:fld id="{E4245ECD-3E8A-534F-BCF2-3F40B55B6962}" type="datetimeFigureOut">
               <a:rPr kumimoji="1" lang="ja-JP" altLang="en-US" smtClean="0"/>
-              <a:t>2021/8/4</a:t>
+              <a:t>2021/11/12</a:t>
             </a:fld>
             <a:endParaRPr kumimoji="1" lang="ja-JP" altLang="en-US"/>
           </a:p>
@@ -966,7 +967,7 @@
           <a:p>
             <a:fld id="{E4245ECD-3E8A-534F-BCF2-3F40B55B6962}" type="datetimeFigureOut">
               <a:rPr kumimoji="1" lang="ja-JP" altLang="en-US" smtClean="0"/>
-              <a:t>2021/8/4</a:t>
+              <a:t>2021/11/12</a:t>
             </a:fld>
             <a:endParaRPr kumimoji="1" lang="ja-JP" altLang="en-US"/>
           </a:p>
@@ -1241,7 +1242,7 @@
           <a:p>
             <a:fld id="{E4245ECD-3E8A-534F-BCF2-3F40B55B6962}" type="datetimeFigureOut">
               <a:rPr kumimoji="1" lang="ja-JP" altLang="en-US" smtClean="0"/>
-              <a:t>2021/8/4</a:t>
+              <a:t>2021/11/12</a:t>
             </a:fld>
             <a:endParaRPr kumimoji="1" lang="ja-JP" altLang="en-US"/>
           </a:p>
@@ -1570,7 +1571,7 @@
           <a:p>
             <a:fld id="{E4245ECD-3E8A-534F-BCF2-3F40B55B6962}" type="datetimeFigureOut">
               <a:rPr kumimoji="1" lang="ja-JP" altLang="en-US" smtClean="0"/>
-              <a:t>2021/8/4</a:t>
+              <a:t>2021/11/12</a:t>
             </a:fld>
             <a:endParaRPr kumimoji="1" lang="ja-JP" altLang="en-US"/>
           </a:p>
@@ -2046,7 +2047,7 @@
           <a:p>
             <a:fld id="{E4245ECD-3E8A-534F-BCF2-3F40B55B6962}" type="datetimeFigureOut">
               <a:rPr kumimoji="1" lang="ja-JP" altLang="en-US" smtClean="0"/>
-              <a:t>2021/8/4</a:t>
+              <a:t>2021/11/12</a:t>
             </a:fld>
             <a:endParaRPr kumimoji="1" lang="ja-JP" altLang="en-US"/>
           </a:p>
@@ -2187,7 +2188,7 @@
           <a:p>
             <a:fld id="{E4245ECD-3E8A-534F-BCF2-3F40B55B6962}" type="datetimeFigureOut">
               <a:rPr kumimoji="1" lang="ja-JP" altLang="en-US" smtClean="0"/>
-              <a:t>2021/8/4</a:t>
+              <a:t>2021/11/12</a:t>
             </a:fld>
             <a:endParaRPr kumimoji="1" lang="ja-JP" altLang="en-US"/>
           </a:p>
@@ -2300,7 +2301,7 @@
           <a:p>
             <a:fld id="{E4245ECD-3E8A-534F-BCF2-3F40B55B6962}" type="datetimeFigureOut">
               <a:rPr kumimoji="1" lang="ja-JP" altLang="en-US" smtClean="0"/>
-              <a:t>2021/8/4</a:t>
+              <a:t>2021/11/12</a:t>
             </a:fld>
             <a:endParaRPr kumimoji="1" lang="ja-JP" altLang="en-US"/>
           </a:p>
@@ -2643,7 +2644,7 @@
           <a:p>
             <a:fld id="{E4245ECD-3E8A-534F-BCF2-3F40B55B6962}" type="datetimeFigureOut">
               <a:rPr kumimoji="1" lang="ja-JP" altLang="en-US" smtClean="0"/>
-              <a:t>2021/8/4</a:t>
+              <a:t>2021/11/12</a:t>
             </a:fld>
             <a:endParaRPr kumimoji="1" lang="ja-JP" altLang="en-US"/>
           </a:p>
@@ -2931,7 +2932,7 @@
           <a:p>
             <a:fld id="{E4245ECD-3E8A-534F-BCF2-3F40B55B6962}" type="datetimeFigureOut">
               <a:rPr kumimoji="1" lang="ja-JP" altLang="en-US" smtClean="0"/>
-              <a:t>2021/8/4</a:t>
+              <a:t>2021/11/12</a:t>
             </a:fld>
             <a:endParaRPr kumimoji="1" lang="ja-JP" altLang="en-US"/>
           </a:p>
@@ -3204,7 +3205,7 @@
           <a:p>
             <a:fld id="{E4245ECD-3E8A-534F-BCF2-3F40B55B6962}" type="datetimeFigureOut">
               <a:rPr kumimoji="1" lang="ja-JP" altLang="en-US" smtClean="0"/>
-              <a:t>2021/8/4</a:t>
+              <a:t>2021/11/12</a:t>
             </a:fld>
             <a:endParaRPr kumimoji="1" lang="ja-JP" altLang="en-US"/>
           </a:p>
@@ -4407,7 +4408,7 @@
             <a:pPr lvl="1"/>
             <a:r>
               <a:rPr lang="en-US" altLang="ja-JP" dirty="0" err="1"/>
-              <a:t>pred.data</a:t>
+              <a:t>pred_data</a:t>
             </a:r>
             <a:r>
               <a:rPr lang="en-US" altLang="ja-JP" dirty="0"/>
@@ -4469,7 +4470,7 @@
             </a:r>
             <a:r>
               <a:rPr lang="en-US" altLang="ja-JP" dirty="0" err="1"/>
-              <a:t>pred.data</a:t>
+              <a:t>pred_data</a:t>
             </a:r>
             <a:r>
               <a:rPr lang="en-US" altLang="ja-JP" dirty="0"/>
@@ -4554,9 +4555,16 @@
             <p:ph idx="1"/>
           </p:nvPr>
         </p:nvSpPr>
-        <p:spPr/>
-        <p:txBody>
-          <a:bodyPr/>
+        <p:spPr>
+          <a:xfrm>
+            <a:off x="838199" y="1825625"/>
+            <a:ext cx="10943897" cy="4351338"/>
+          </a:xfrm>
+        </p:spPr>
+        <p:txBody>
+          <a:bodyPr>
+            <a:normAutofit lnSpcReduction="10000"/>
+          </a:bodyPr>
           <a:lstStyle/>
           <a:p>
             <a:r>
@@ -4623,7 +4631,7 @@
             <a:pPr lvl="1"/>
             <a:r>
               <a:rPr lang="en-US" altLang="ja-JP" dirty="0" err="1"/>
-              <a:t>pred.data</a:t>
+              <a:t>pred_data</a:t>
             </a:r>
             <a:r>
               <a:rPr lang="en-US" altLang="ja-JP" dirty="0"/>
@@ -4641,8 +4649,12 @@
           <a:p>
             <a:pPr lvl="1"/>
             <a:r>
-              <a:rPr lang="en-US" altLang="ja-JP" dirty="0"/>
-              <a:t>predict(</a:t>
+              <a:rPr lang="en-US" altLang="ja-JP" dirty="0" err="1"/>
+              <a:t>pred_catch</a:t>
+            </a:r>
+            <a:r>
+              <a:rPr lang="en-US" altLang="ja-JP" dirty="0"/>
+              <a:t> &lt;- predict(</a:t>
             </a:r>
             <a:r>
               <a:rPr lang="en-US" altLang="ja-JP" dirty="0" err="1"/>
@@ -4662,11 +4674,54 @@
             </a:r>
             <a:r>
               <a:rPr lang="en-US" altLang="ja-JP" dirty="0" err="1"/>
-              <a:t>pred.data</a:t>
+              <a:t>pred_data</a:t>
             </a:r>
             <a:r>
               <a:rPr lang="en-US" altLang="ja-JP" dirty="0"/>
               <a:t>)</a:t>
+            </a:r>
+          </a:p>
+          <a:p>
+            <a:pPr lvl="1"/>
+            <a:r>
+              <a:rPr lang="en-US" altLang="ja-JP" dirty="0" err="1"/>
+              <a:t>pred_res</a:t>
+            </a:r>
+            <a:r>
+              <a:rPr lang="en-US" altLang="ja-JP" dirty="0"/>
+              <a:t> &lt;- </a:t>
+            </a:r>
+            <a:r>
+              <a:rPr lang="en-US" altLang="ja-JP" dirty="0" err="1"/>
+              <a:t>cbind</a:t>
+            </a:r>
+            <a:r>
+              <a:rPr lang="en-US" altLang="ja-JP" dirty="0"/>
+              <a:t>(</a:t>
+            </a:r>
+            <a:r>
+              <a:rPr lang="en-US" altLang="ja-JP" dirty="0" err="1"/>
+              <a:t>pred_data</a:t>
+            </a:r>
+            <a:r>
+              <a:rPr lang="en-US" altLang="ja-JP" dirty="0"/>
+              <a:t>, </a:t>
+            </a:r>
+            <a:r>
+              <a:rPr lang="en-US" altLang="ja-JP" dirty="0" err="1"/>
+              <a:t>as.data.frame</a:t>
+            </a:r>
+            <a:r>
+              <a:rPr lang="en-US" altLang="ja-JP" dirty="0"/>
+              <a:t>(</a:t>
+            </a:r>
+            <a:r>
+              <a:rPr lang="en-US" altLang="ja-JP" dirty="0" err="1"/>
+              <a:t>pred_catch</a:t>
+            </a:r>
+            <a:r>
+              <a:rPr lang="en-US" altLang="ja-JP" dirty="0"/>
+              <a:t>))</a:t>
             </a:r>
             <a:endParaRPr lang="ja-JP" altLang="en-US"/>
           </a:p>
@@ -4730,7 +4785,7 @@
           <p:cNvPr id="2" name="タイトル 1">
             <a:extLst>
               <a:ext uri="{FF2B5EF4-FFF2-40B4-BE49-F238E27FC236}">
-                <a16:creationId xmlns:a16="http://schemas.microsoft.com/office/drawing/2014/main" id="{528EA11C-5A7F-1B44-815F-432C012F0165}"/>
+                <a16:creationId xmlns:a16="http://schemas.microsoft.com/office/drawing/2014/main" id="{F4297376-3955-5749-B279-EFC3B53B83F0}"/>
               </a:ext>
             </a:extLst>
           </p:cNvPr>
@@ -4746,116 +4801,176 @@
           <a:bodyPr/>
           <a:lstStyle/>
           <a:p>
+            <a:r>
+              <a:rPr lang="ja-JP" altLang="en-US"/>
+              <a:t>交互作用に含まれる変数の効果抽出</a:t>
+            </a:r>
+            <a:endParaRPr kumimoji="1" lang="ja-JP" altLang="en-US"/>
+          </a:p>
+        </p:txBody>
+      </p:sp>
+      <p:sp>
+        <p:nvSpPr>
+          <p:cNvPr id="3" name="コンテンツ プレースホルダー 2">
+            <a:extLst>
+              <a:ext uri="{FF2B5EF4-FFF2-40B4-BE49-F238E27FC236}">
+                <a16:creationId xmlns:a16="http://schemas.microsoft.com/office/drawing/2014/main" id="{B221B7D2-CEBA-6C45-8964-EAC43FF47E31}"/>
+              </a:ext>
+            </a:extLst>
+          </p:cNvPr>
+          <p:cNvSpPr>
+            <a:spLocks noGrp="1"/>
+          </p:cNvSpPr>
+          <p:nvPr>
+            <p:ph idx="1"/>
+          </p:nvPr>
+        </p:nvSpPr>
+        <p:spPr>
+          <a:xfrm>
+            <a:off x="838200" y="1825625"/>
+            <a:ext cx="10515600" cy="4667250"/>
+          </a:xfrm>
+        </p:spPr>
+        <p:txBody>
+          <a:bodyPr>
+            <a:normAutofit fontScale="85000" lnSpcReduction="20000"/>
+          </a:bodyPr>
+          <a:lstStyle/>
+          <a:p>
+            <a:r>
+              <a:rPr kumimoji="1" lang="ja-JP" altLang="en-US"/>
+              <a:t>第</a:t>
+            </a:r>
+            <a:r>
+              <a:rPr kumimoji="1" lang="en-US" altLang="ja-JP" dirty="0"/>
+              <a:t>19,21</a:t>
+            </a:r>
+            <a:r>
+              <a:rPr kumimoji="1" lang="ja-JP" altLang="en-US"/>
+              <a:t>回で</a:t>
+            </a:r>
             <a:r>
               <a:rPr kumimoji="1" lang="en-US" altLang="ja-JP" dirty="0" err="1"/>
               <a:t>glm</a:t>
             </a:r>
             <a:r>
               <a:rPr kumimoji="1" lang="ja-JP" altLang="en-US"/>
-              <a:t>のオブジェクトで</a:t>
-            </a:r>
-            <a:r>
-              <a:rPr kumimoji="1" lang="en-US" altLang="ja-JP" dirty="0"/>
-              <a:t>predict</a:t>
-            </a:r>
-            <a:endParaRPr kumimoji="1" lang="ja-JP" altLang="en-US"/>
-          </a:p>
-        </p:txBody>
-      </p:sp>
-      <p:sp>
-        <p:nvSpPr>
-          <p:cNvPr id="3" name="コンテンツ プレースホルダー 2">
-            <a:extLst>
-              <a:ext uri="{FF2B5EF4-FFF2-40B4-BE49-F238E27FC236}">
-                <a16:creationId xmlns:a16="http://schemas.microsoft.com/office/drawing/2014/main" id="{D071F35D-9557-6549-ADAC-27EF0A1D74EE}"/>
-              </a:ext>
-            </a:extLst>
-          </p:cNvPr>
-          <p:cNvSpPr>
-            <a:spLocks noGrp="1"/>
-          </p:cNvSpPr>
-          <p:nvPr>
-            <p:ph idx="1"/>
-          </p:nvPr>
-        </p:nvSpPr>
-        <p:spPr/>
-        <p:txBody>
-          <a:bodyPr/>
-          <a:lstStyle/>
-          <a:p>
+              <a:t>の説明変数のなかから一つの変数効果を係数をとってくることで抽出し</a:t>
+            </a:r>
+            <a:r>
+              <a:rPr lang="ja-JP" altLang="en-US"/>
+              <a:t>たが、交互作用がある場合は係数だけで効果が取り出せない。</a:t>
+            </a:r>
+            <a:endParaRPr lang="en-US" altLang="ja-JP" dirty="0"/>
+          </a:p>
+          <a:p>
+            <a:endParaRPr lang="en-US" altLang="ja-JP" dirty="0"/>
+          </a:p>
+          <a:p>
+            <a:r>
+              <a:rPr lang="ja-JP" altLang="en-US"/>
+              <a:t>第</a:t>
+            </a:r>
+            <a:r>
+              <a:rPr lang="en-US" altLang="ja-JP" dirty="0"/>
+              <a:t>15</a:t>
+            </a:r>
+            <a:r>
+              <a:rPr lang="ja-JP" altLang="en-US"/>
+              <a:t>回で生成したシミュレーションデータの線形モデル解析結果を利用．</a:t>
+            </a:r>
+            <a:endParaRPr lang="en-US" altLang="ja-JP" dirty="0"/>
+          </a:p>
+          <a:p>
+            <a:pPr lvl="1"/>
+            <a:r>
+              <a:rPr lang="en-US" altLang="ja-JP" dirty="0"/>
+              <a:t>res_lm2 &lt;- </a:t>
+            </a:r>
             <a:r>
               <a:rPr lang="en-US" altLang="ja-JP" dirty="0" err="1"/>
-              <a:t>glm</a:t>
-            </a:r>
+              <a:t>lm</a:t>
+            </a:r>
+            <a:r>
+              <a:rPr lang="en-US" altLang="ja-JP" dirty="0"/>
+              <a:t>(log(catch)~vessel+temp+vessel:temp-1, data=</a:t>
+            </a:r>
+            <a:r>
+              <a:rPr lang="en-US" altLang="ja-JP" dirty="0" err="1"/>
+              <a:t>catch_data</a:t>
+            </a:r>
+            <a:r>
+              <a:rPr lang="en-US" altLang="ja-JP" dirty="0"/>
+              <a:t>)</a:t>
+            </a:r>
+          </a:p>
+          <a:p>
+            <a:pPr lvl="1"/>
+            <a:endParaRPr lang="en-US" altLang="ja-JP" dirty="0"/>
+          </a:p>
+          <a:p>
             <a:r>
               <a:rPr lang="ja-JP" altLang="en-US"/>
-              <a:t>の結果オブジェクトも</a:t>
-            </a:r>
-            <a:r>
-              <a:rPr lang="en-US" altLang="ja-JP" dirty="0"/>
-              <a:t>predict</a:t>
+              <a:t>船は</a:t>
+            </a:r>
+            <a:r>
+              <a:rPr lang="en-US" altLang="ja-JP" dirty="0"/>
+              <a:t>v1,v2</a:t>
             </a:r>
             <a:r>
               <a:rPr lang="ja-JP" altLang="en-US"/>
-              <a:t>関数の引数に入れられる</a:t>
+              <a:t>、温度は</a:t>
+            </a:r>
+            <a:r>
+              <a:rPr lang="en-US" altLang="ja-JP" dirty="0"/>
+              <a:t>15</a:t>
+            </a:r>
+            <a:r>
+              <a:rPr lang="ja-JP" altLang="en-US"/>
+              <a:t>度から</a:t>
+            </a:r>
+            <a:r>
+              <a:rPr lang="en-US" altLang="ja-JP" dirty="0"/>
+              <a:t>30</a:t>
+            </a:r>
+            <a:r>
+              <a:rPr lang="ja-JP" altLang="en-US"/>
+              <a:t>度まで</a:t>
+            </a:r>
+            <a:r>
+              <a:rPr lang="en-US" altLang="ja-JP" dirty="0"/>
+              <a:t>5℃</a:t>
+            </a:r>
+            <a:r>
+              <a:rPr lang="ja-JP" altLang="en-US"/>
+              <a:t>刻みとすると、、</a:t>
             </a:r>
             <a:endParaRPr lang="en-US" altLang="ja-JP" dirty="0"/>
           </a:p>
           <a:p>
-            <a:endParaRPr kumimoji="1" lang="en-US" altLang="ja-JP" dirty="0"/>
-          </a:p>
-          <a:p>
-            <a:r>
-              <a:rPr lang="ja-JP" altLang="en-US"/>
-              <a:t>この場合、引数で</a:t>
-            </a:r>
-            <a:r>
-              <a:rPr lang="en-US" altLang="ja-JP" dirty="0"/>
-              <a:t>type=‘response’</a:t>
-            </a:r>
-            <a:r>
-              <a:rPr lang="ja-JP" altLang="en-US"/>
-              <a:t>とするとリンク関数の逆関数で返し、応答変数の範囲に変換（</a:t>
-            </a:r>
-            <a:r>
-              <a:rPr lang="en-US" altLang="ja-JP" dirty="0"/>
-              <a:t>log</a:t>
-            </a:r>
-            <a:r>
-              <a:rPr lang="ja-JP" altLang="en-US"/>
-              <a:t>リンクであれば、</a:t>
-            </a:r>
-            <a:r>
-              <a:rPr lang="en-US" altLang="ja-JP" dirty="0"/>
-              <a:t>exp(</a:t>
-            </a:r>
-            <a:r>
-              <a:rPr lang="ja-JP" altLang="en-US"/>
-              <a:t>線形予測子</a:t>
-            </a:r>
-            <a:r>
-              <a:rPr lang="en-US" altLang="ja-JP" dirty="0"/>
-              <a:t>) </a:t>
-            </a:r>
-            <a:r>
-              <a:rPr lang="ja-JP" altLang="en-US"/>
-              <a:t>）</a:t>
-            </a:r>
-            <a:endParaRPr lang="en-US" altLang="ja-JP" dirty="0"/>
-          </a:p>
-          <a:p>
             <a:pPr lvl="1"/>
             <a:r>
-              <a:rPr lang="en-US" altLang="ja-JP" dirty="0"/>
-              <a:t>predict(</a:t>
-            </a:r>
-            <a:r>
               <a:rPr lang="en-US" altLang="ja-JP" dirty="0" err="1"/>
-              <a:t>res_glm</a:t>
-            </a:r>
-            <a:r>
-              <a:rPr lang="en-US" altLang="ja-JP" dirty="0"/>
-              <a:t>, </a:t>
+              <a:t>pred_data</a:t>
+            </a:r>
+            <a:r>
+              <a:rPr lang="en-US" altLang="ja-JP" dirty="0"/>
+              <a:t> &lt;- </a:t>
+            </a:r>
+            <a:r>
+              <a:rPr lang="en-US" altLang="ja-JP" dirty="0" err="1"/>
+              <a:t>expand.grid</a:t>
+            </a:r>
+            <a:r>
+              <a:rPr lang="en-US" altLang="ja-JP" dirty="0"/>
+              <a:t>(vessel=c(”v1”,”v2”), temp=seq(15,30,by=5) )</a:t>
+            </a:r>
+          </a:p>
+          <a:p>
+            <a:pPr lvl="1"/>
+            <a:r>
+              <a:rPr lang="en-US" altLang="ja-JP" dirty="0"/>
+              <a:t>pred_catch2&lt;-predict(res_lm2, </a:t>
             </a:r>
             <a:r>
               <a:rPr lang="en-US" altLang="ja-JP" dirty="0" err="1"/>
@@ -4867,20 +4982,108 @@
             </a:r>
             <a:r>
               <a:rPr lang="en-US" altLang="ja-JP" dirty="0" err="1"/>
-              <a:t>pred.data</a:t>
-            </a:r>
-            <a:r>
-              <a:rPr lang="en-US" altLang="ja-JP" dirty="0"/>
-              <a:t>, type=‘response’)</a:t>
-            </a:r>
-            <a:endParaRPr kumimoji="1" lang="ja-JP" altLang="en-US"/>
+              <a:t>pred_data</a:t>
+            </a:r>
+            <a:r>
+              <a:rPr lang="en-US" altLang="ja-JP" dirty="0"/>
+              <a:t>)</a:t>
+            </a:r>
+          </a:p>
+          <a:p>
+            <a:pPr lvl="1"/>
+            <a:r>
+              <a:rPr lang="en-US" altLang="ja-JP" dirty="0" err="1"/>
+              <a:t>pred_res</a:t>
+            </a:r>
+            <a:r>
+              <a:rPr lang="en-US" altLang="ja-JP" dirty="0"/>
+              <a:t> &lt;- </a:t>
+            </a:r>
+            <a:r>
+              <a:rPr lang="en-US" altLang="ja-JP" dirty="0" err="1"/>
+              <a:t>cbind</a:t>
+            </a:r>
+            <a:r>
+              <a:rPr lang="en-US" altLang="ja-JP" dirty="0"/>
+              <a:t>(</a:t>
+            </a:r>
+            <a:r>
+              <a:rPr lang="en-US" altLang="ja-JP" dirty="0" err="1"/>
+              <a:t>pred_res</a:t>
+            </a:r>
+            <a:r>
+              <a:rPr lang="en-US" altLang="ja-JP" dirty="0"/>
+              <a:t>, </a:t>
+            </a:r>
+            <a:r>
+              <a:rPr lang="en-US" altLang="ja-JP" dirty="0" err="1"/>
+              <a:t>as.data.frame</a:t>
+            </a:r>
+            <a:r>
+              <a:rPr lang="en-US" altLang="ja-JP" dirty="0"/>
+              <a:t>(pred_catch2))</a:t>
+            </a:r>
+            <a:endParaRPr lang="ja-JP" altLang="en-US"/>
+          </a:p>
+          <a:p>
+            <a:endParaRPr kumimoji="1" lang="en-US" altLang="ja-JP" dirty="0"/>
+          </a:p>
+          <a:p>
+            <a:r>
+              <a:rPr kumimoji="1" lang="ja-JP" altLang="en-US"/>
+              <a:t>船の効果を取り出す（第</a:t>
+            </a:r>
+            <a:r>
+              <a:rPr kumimoji="1" lang="en-US" altLang="ja-JP" dirty="0"/>
+              <a:t>20</a:t>
+            </a:r>
+            <a:r>
+              <a:rPr kumimoji="1" lang="ja-JP" altLang="en-US"/>
+              <a:t>回のノミナル</a:t>
+            </a:r>
+            <a:r>
+              <a:rPr kumimoji="1" lang="en-US" altLang="ja-JP" dirty="0"/>
+              <a:t>CPUE</a:t>
+            </a:r>
+            <a:r>
+              <a:rPr kumimoji="1" lang="ja-JP" altLang="en-US"/>
+              <a:t>計算と同じ</a:t>
+            </a:r>
+            <a:r>
+              <a:rPr lang="ja-JP" altLang="en-US"/>
+              <a:t>要領</a:t>
+            </a:r>
+            <a:r>
+              <a:rPr kumimoji="1" lang="ja-JP" altLang="en-US"/>
+              <a:t>）</a:t>
+            </a:r>
+            <a:endParaRPr kumimoji="1" lang="en-US" altLang="ja-JP" dirty="0"/>
+          </a:p>
+          <a:p>
+            <a:pPr lvl="1"/>
+            <a:r>
+              <a:rPr lang="en-US" altLang="ja-JP" dirty="0" err="1"/>
+              <a:t>tapply</a:t>
+            </a:r>
+            <a:r>
+              <a:rPr lang="en-US" altLang="ja-JP" dirty="0"/>
+              <a:t>(pred_res$pred_catch2, </a:t>
+            </a:r>
+            <a:r>
+              <a:rPr lang="en-US" altLang="ja-JP" dirty="0" err="1"/>
+              <a:t>pred_res$vessel</a:t>
+            </a:r>
+            <a:r>
+              <a:rPr lang="en-US" altLang="ja-JP" dirty="0"/>
+              <a:t>, mean)</a:t>
+            </a:r>
           </a:p>
         </p:txBody>
       </p:sp>
     </p:spTree>
     <p:extLst>
       <p:ext uri="{BB962C8B-B14F-4D97-AF65-F5344CB8AC3E}">
-        <p14:creationId xmlns:p14="http://schemas.microsoft.com/office/powerpoint/2010/main" val="9939205"/>
+        <p14:creationId xmlns:p14="http://schemas.microsoft.com/office/powerpoint/2010/main" val="1124775928"/>
       </p:ext>
     </p:extLst>
   </p:cSld>
@@ -4912,7 +5115,7 @@
           <p:cNvPr id="2" name="タイトル 1">
             <a:extLst>
               <a:ext uri="{FF2B5EF4-FFF2-40B4-BE49-F238E27FC236}">
-                <a16:creationId xmlns:a16="http://schemas.microsoft.com/office/drawing/2014/main" id="{4A2E1266-4BC3-7146-A393-44EBE83FB634}"/>
+                <a16:creationId xmlns:a16="http://schemas.microsoft.com/office/drawing/2014/main" id="{528EA11C-5A7F-1B44-815F-432C012F0165}"/>
               </a:ext>
             </a:extLst>
           </p:cNvPr>
@@ -4928,14 +5131,19 @@
           <a:bodyPr/>
           <a:lstStyle/>
           <a:p>
+            <a:r>
+              <a:rPr kumimoji="1" lang="en-US" altLang="ja-JP" dirty="0" err="1"/>
+              <a:t>glm</a:t>
+            </a:r>
+            <a:r>
+              <a:rPr kumimoji="1" lang="ja-JP" altLang="en-US"/>
+              <a:t>のオブジェクトで</a:t>
+            </a:r>
             <a:r>
               <a:rPr kumimoji="1" lang="en-US" altLang="ja-JP" dirty="0"/>
               <a:t>predict</a:t>
             </a:r>
-            <a:r>
-              <a:rPr kumimoji="1" lang="ja-JP" altLang="en-US"/>
-              <a:t>関数で信頼区間を求める</a:t>
-            </a:r>
+            <a:endParaRPr kumimoji="1" lang="ja-JP" altLang="en-US"/>
           </a:p>
         </p:txBody>
       </p:sp>
@@ -4944,7 +5152,7 @@
           <p:cNvPr id="3" name="コンテンツ プレースホルダー 2">
             <a:extLst>
               <a:ext uri="{FF2B5EF4-FFF2-40B4-BE49-F238E27FC236}">
-                <a16:creationId xmlns:a16="http://schemas.microsoft.com/office/drawing/2014/main" id="{4497F9D3-52AE-7747-AF5B-1B9FA5752C16}"/>
+                <a16:creationId xmlns:a16="http://schemas.microsoft.com/office/drawing/2014/main" id="{D071F35D-9557-6549-ADAC-27EF0A1D74EE}"/>
               </a:ext>
             </a:extLst>
           </p:cNvPr>
@@ -4953,6 +5161,151 @@
           </p:cNvSpPr>
           <p:nvPr>
             <p:ph idx="1"/>
+          </p:nvPr>
+        </p:nvSpPr>
+        <p:spPr/>
+        <p:txBody>
+          <a:bodyPr/>
+          <a:lstStyle/>
+          <a:p>
+            <a:r>
+              <a:rPr lang="en-US" altLang="ja-JP" dirty="0" err="1"/>
+              <a:t>glm</a:t>
+            </a:r>
+            <a:r>
+              <a:rPr lang="ja-JP" altLang="en-US"/>
+              <a:t>の結果オブジェクトも</a:t>
+            </a:r>
+            <a:r>
+              <a:rPr lang="en-US" altLang="ja-JP" dirty="0"/>
+              <a:t>predict</a:t>
+            </a:r>
+            <a:r>
+              <a:rPr lang="ja-JP" altLang="en-US"/>
+              <a:t>関数の引数に入れられる</a:t>
+            </a:r>
+            <a:endParaRPr lang="en-US" altLang="ja-JP" dirty="0"/>
+          </a:p>
+          <a:p>
+            <a:endParaRPr kumimoji="1" lang="en-US" altLang="ja-JP" dirty="0"/>
+          </a:p>
+          <a:p>
+            <a:r>
+              <a:rPr lang="ja-JP" altLang="en-US"/>
+              <a:t>この場合、引数で</a:t>
+            </a:r>
+            <a:r>
+              <a:rPr lang="en-US" altLang="ja-JP" dirty="0"/>
+              <a:t>type=‘response’</a:t>
+            </a:r>
+            <a:r>
+              <a:rPr lang="ja-JP" altLang="en-US"/>
+              <a:t>とするとリンク関数の逆関数で返し、応答変数の範囲に変換（</a:t>
+            </a:r>
+            <a:r>
+              <a:rPr lang="en-US" altLang="ja-JP" dirty="0"/>
+              <a:t>log</a:t>
+            </a:r>
+            <a:r>
+              <a:rPr lang="ja-JP" altLang="en-US"/>
+              <a:t>リンクであれば、</a:t>
+            </a:r>
+            <a:r>
+              <a:rPr lang="en-US" altLang="ja-JP" dirty="0"/>
+              <a:t>exp(</a:t>
+            </a:r>
+            <a:r>
+              <a:rPr lang="ja-JP" altLang="en-US"/>
+              <a:t>線形予測子</a:t>
+            </a:r>
+            <a:r>
+              <a:rPr lang="en-US" altLang="ja-JP" dirty="0"/>
+              <a:t>) </a:t>
+            </a:r>
+            <a:r>
+              <a:rPr lang="ja-JP" altLang="en-US"/>
+              <a:t>）</a:t>
+            </a:r>
+            <a:endParaRPr lang="en-US" altLang="ja-JP" dirty="0"/>
+          </a:p>
+          <a:p>
+            <a:pPr lvl="1"/>
+            <a:r>
+              <a:rPr lang="en-US" altLang="ja-JP" dirty="0"/>
+              <a:t>predict(</a:t>
+            </a:r>
+            <a:r>
+              <a:rPr lang="en-US" altLang="ja-JP" dirty="0" err="1"/>
+              <a:t>res_glm</a:t>
+            </a:r>
+            <a:r>
+              <a:rPr lang="en-US" altLang="ja-JP" dirty="0"/>
+              <a:t>, </a:t>
+            </a:r>
+            <a:r>
+              <a:rPr lang="en-US" altLang="ja-JP" dirty="0" err="1"/>
+              <a:t>newdata</a:t>
+            </a:r>
+            <a:r>
+              <a:rPr lang="en-US" altLang="ja-JP" dirty="0"/>
+              <a:t>=</a:t>
+            </a:r>
+            <a:r>
+              <a:rPr lang="en-US" altLang="ja-JP" dirty="0" err="1"/>
+              <a:t>pred_data</a:t>
+            </a:r>
+            <a:r>
+              <a:rPr lang="en-US" altLang="ja-JP" dirty="0"/>
+              <a:t>, type=‘response’)</a:t>
+            </a:r>
+            <a:endParaRPr kumimoji="1" lang="ja-JP" altLang="en-US"/>
+          </a:p>
+        </p:txBody>
+      </p:sp>
+    </p:spTree>
+    <p:extLst>
+      <p:ext uri="{BB962C8B-B14F-4D97-AF65-F5344CB8AC3E}">
+        <p14:creationId xmlns:p14="http://schemas.microsoft.com/office/powerpoint/2010/main" val="9939205"/>
+      </p:ext>
+    </p:extLst>
+  </p:cSld>
+  <p:clrMapOvr>
+    <a:masterClrMapping/>
+  </p:clrMapOvr>
+</p:sld>
+</file>
+
+<file path=ppt/slides/slide8.xml><?xml version="1.0" encoding="utf-8"?>
+<p:sld xmlns:a="http://schemas.openxmlformats.org/drawingml/2006/main" xmlns:r="http://schemas.openxmlformats.org/officeDocument/2006/relationships" xmlns:p="http://schemas.openxmlformats.org/presentationml/2006/main">
+  <p:cSld>
+    <p:spTree>
+      <p:nvGrpSpPr>
+        <p:cNvPr id="1" name=""/>
+        <p:cNvGrpSpPr/>
+        <p:nvPr/>
+      </p:nvGrpSpPr>
+      <p:grpSpPr>
+        <a:xfrm>
+          <a:off x="0" y="0"/>
+          <a:ext cx="0" cy="0"/>
+          <a:chOff x="0" y="0"/>
+          <a:chExt cx="0" cy="0"/>
+        </a:xfrm>
+      </p:grpSpPr>
+      <p:sp>
+        <p:nvSpPr>
+          <p:cNvPr id="2" name="タイトル 1">
+            <a:extLst>
+              <a:ext uri="{FF2B5EF4-FFF2-40B4-BE49-F238E27FC236}">
+                <a16:creationId xmlns:a16="http://schemas.microsoft.com/office/drawing/2014/main" id="{4A2E1266-4BC3-7146-A393-44EBE83FB634}"/>
+              </a:ext>
+            </a:extLst>
+          </p:cNvPr>
+          <p:cNvSpPr>
+            <a:spLocks noGrp="1"/>
+          </p:cNvSpPr>
+          <p:nvPr>
+            <p:ph type="title"/>
           </p:nvPr>
         </p:nvSpPr>
         <p:spPr/>
@@ -4966,6 +5319,38 @@
             </a:r>
             <a:r>
               <a:rPr kumimoji="1" lang="ja-JP" altLang="en-US"/>
+              <a:t>関数で信頼区間を求める</a:t>
+            </a:r>
+          </a:p>
+        </p:txBody>
+      </p:sp>
+      <p:sp>
+        <p:nvSpPr>
+          <p:cNvPr id="3" name="コンテンツ プレースホルダー 2">
+            <a:extLst>
+              <a:ext uri="{FF2B5EF4-FFF2-40B4-BE49-F238E27FC236}">
+                <a16:creationId xmlns:a16="http://schemas.microsoft.com/office/drawing/2014/main" id="{4497F9D3-52AE-7747-AF5B-1B9FA5752C16}"/>
+              </a:ext>
+            </a:extLst>
+          </p:cNvPr>
+          <p:cNvSpPr>
+            <a:spLocks noGrp="1"/>
+          </p:cNvSpPr>
+          <p:nvPr>
+            <p:ph idx="1"/>
+          </p:nvPr>
+        </p:nvSpPr>
+        <p:spPr/>
+        <p:txBody>
+          <a:bodyPr/>
+          <a:lstStyle/>
+          <a:p>
+            <a:r>
+              <a:rPr kumimoji="1" lang="en-US" altLang="ja-JP" dirty="0"/>
+              <a:t>predict</a:t>
+            </a:r>
+            <a:r>
+              <a:rPr kumimoji="1" lang="ja-JP" altLang="en-US"/>
               <a:t>関数は引数のオプション</a:t>
             </a:r>
             <a:r>
@@ -5030,11 +5415,11 @@
             </a:r>
             <a:r>
               <a:rPr lang="en-US" altLang="ja-JP" dirty="0" err="1"/>
-              <a:t>pred.dat</a:t>
-            </a:r>
-            <a:r>
-              <a:rPr lang="en-US" altLang="ja-JP" dirty="0"/>
-              <a:t>, 				                                interval=‘confidence’, level=0.90)</a:t>
+              <a:t>pred_data</a:t>
+            </a:r>
+            <a:r>
+              <a:rPr lang="en-US" altLang="ja-JP" dirty="0"/>
+              <a:t>, 				                            interval=‘confidence’, level=0.90)</a:t>
             </a:r>
           </a:p>
           <a:p>
@@ -5097,7 +5482,7 @@
 </p:sld>
 </file>
 
-<file path=ppt/slides/slide8.xml><?xml version="1.0" encoding="utf-8"?>
+<file path=ppt/slides/slide9.xml><?xml version="1.0" encoding="utf-8"?>
 <p:sld xmlns:a="http://schemas.openxmlformats.org/drawingml/2006/main" xmlns:r="http://schemas.openxmlformats.org/officeDocument/2006/relationships" xmlns:p="http://schemas.openxmlformats.org/presentationml/2006/main">
   <p:cSld>
     <p:spTree>

</xml_diff>